<commit_message>
fixed axis on graph 2
</commit_message>
<xml_diff>
--- a/poster/Poster_DataExpo2013_Kaplan_Hare.pptx
+++ b/poster/Poster_DataExpo2013_Kaplan_Hare.pptx
@@ -192,7 +192,7 @@
           <a:p>
             <a:fld id="{FB9341E4-CD2F-49AF-BE6F-5123F55E34CC}" type="datetimeFigureOut">
               <a:rPr lang="en-US" smtClean="0"/>
-              <a:t>7/29/2013</a:t>
+              <a:t>7/30/2013</a:t>
             </a:fld>
             <a:endParaRPr lang="en-US"/>
           </a:p>
@@ -725,7 +725,7 @@
           <a:p>
             <a:fld id="{EC5820C2-EEC8-4B3E-825C-12D1B6D3BEB7}" type="datetimeFigureOut">
               <a:rPr lang="en-US" smtClean="0"/>
-              <a:t>7/29/2013</a:t>
+              <a:t>7/30/2013</a:t>
             </a:fld>
             <a:endParaRPr lang="en-US"/>
           </a:p>
@@ -895,7 +895,7 @@
           <a:p>
             <a:fld id="{EC5820C2-EEC8-4B3E-825C-12D1B6D3BEB7}" type="datetimeFigureOut">
               <a:rPr lang="en-US" smtClean="0"/>
-              <a:t>7/29/2013</a:t>
+              <a:t>7/30/2013</a:t>
             </a:fld>
             <a:endParaRPr lang="en-US"/>
           </a:p>
@@ -1075,7 +1075,7 @@
           <a:p>
             <a:fld id="{EC5820C2-EEC8-4B3E-825C-12D1B6D3BEB7}" type="datetimeFigureOut">
               <a:rPr lang="en-US" smtClean="0"/>
-              <a:t>7/29/2013</a:t>
+              <a:t>7/30/2013</a:t>
             </a:fld>
             <a:endParaRPr lang="en-US"/>
           </a:p>
@@ -1245,7 +1245,7 @@
           <a:p>
             <a:fld id="{EC5820C2-EEC8-4B3E-825C-12D1B6D3BEB7}" type="datetimeFigureOut">
               <a:rPr lang="en-US" smtClean="0"/>
-              <a:t>7/29/2013</a:t>
+              <a:t>7/30/2013</a:t>
             </a:fld>
             <a:endParaRPr lang="en-US"/>
           </a:p>
@@ -1491,7 +1491,7 @@
           <a:p>
             <a:fld id="{EC5820C2-EEC8-4B3E-825C-12D1B6D3BEB7}" type="datetimeFigureOut">
               <a:rPr lang="en-US" smtClean="0"/>
-              <a:t>7/29/2013</a:t>
+              <a:t>7/30/2013</a:t>
             </a:fld>
             <a:endParaRPr lang="en-US"/>
           </a:p>
@@ -1779,7 +1779,7 @@
           <a:p>
             <a:fld id="{EC5820C2-EEC8-4B3E-825C-12D1B6D3BEB7}" type="datetimeFigureOut">
               <a:rPr lang="en-US" smtClean="0"/>
-              <a:t>7/29/2013</a:t>
+              <a:t>7/30/2013</a:t>
             </a:fld>
             <a:endParaRPr lang="en-US"/>
           </a:p>
@@ -2201,7 +2201,7 @@
           <a:p>
             <a:fld id="{EC5820C2-EEC8-4B3E-825C-12D1B6D3BEB7}" type="datetimeFigureOut">
               <a:rPr lang="en-US" smtClean="0"/>
-              <a:t>7/29/2013</a:t>
+              <a:t>7/30/2013</a:t>
             </a:fld>
             <a:endParaRPr lang="en-US"/>
           </a:p>
@@ -2319,7 +2319,7 @@
           <a:p>
             <a:fld id="{EC5820C2-EEC8-4B3E-825C-12D1B6D3BEB7}" type="datetimeFigureOut">
               <a:rPr lang="en-US" smtClean="0"/>
-              <a:t>7/29/2013</a:t>
+              <a:t>7/30/2013</a:t>
             </a:fld>
             <a:endParaRPr lang="en-US"/>
           </a:p>
@@ -2414,7 +2414,7 @@
           <a:p>
             <a:fld id="{EC5820C2-EEC8-4B3E-825C-12D1B6D3BEB7}" type="datetimeFigureOut">
               <a:rPr lang="en-US" smtClean="0"/>
-              <a:t>7/29/2013</a:t>
+              <a:t>7/30/2013</a:t>
             </a:fld>
             <a:endParaRPr lang="en-US"/>
           </a:p>
@@ -2691,7 +2691,7 @@
           <a:p>
             <a:fld id="{EC5820C2-EEC8-4B3E-825C-12D1B6D3BEB7}" type="datetimeFigureOut">
               <a:rPr lang="en-US" smtClean="0"/>
-              <a:t>7/29/2013</a:t>
+              <a:t>7/30/2013</a:t>
             </a:fld>
             <a:endParaRPr lang="en-US"/>
           </a:p>
@@ -2944,7 +2944,7 @@
           <a:p>
             <a:fld id="{EC5820C2-EEC8-4B3E-825C-12D1B6D3BEB7}" type="datetimeFigureOut">
               <a:rPr lang="en-US" smtClean="0"/>
-              <a:t>7/29/2013</a:t>
+              <a:t>7/30/2013</a:t>
             </a:fld>
             <a:endParaRPr lang="en-US"/>
           </a:p>
@@ -3157,7 +3157,7 @@
           <a:p>
             <a:fld id="{EC5820C2-EEC8-4B3E-825C-12D1B6D3BEB7}" type="datetimeFigureOut">
               <a:rPr lang="en-US" smtClean="0"/>
-              <a:t>7/29/2013</a:t>
+              <a:t>7/30/2013</a:t>
             </a:fld>
             <a:endParaRPr lang="en-US"/>
           </a:p>
@@ -4592,7 +4592,7 @@
         </p:nvSpPr>
         <p:spPr>
           <a:xfrm>
-            <a:off x="369506" y="433954"/>
+            <a:off x="369506" y="482080"/>
             <a:ext cx="43148257" cy="2246769"/>
           </a:xfrm>
           <a:prstGeom prst="rect">
@@ -4645,12 +4645,12 @@
         </p:nvSpPr>
         <p:spPr>
           <a:xfrm>
-            <a:off x="629976" y="3435699"/>
-            <a:ext cx="11810997" cy="2138817"/>
+            <a:off x="629976" y="3387574"/>
+            <a:ext cx="11810997" cy="1918558"/>
           </a:xfrm>
           <a:prstGeom prst="roundRect">
             <a:avLst>
-              <a:gd name="adj" fmla="val 8663"/>
+              <a:gd name="adj" fmla="val 5110"/>
             </a:avLst>
           </a:prstGeom>
           <a:noFill/>
@@ -4696,12 +4696,12 @@
         </p:nvSpPr>
         <p:spPr>
           <a:xfrm>
-            <a:off x="629976" y="5779425"/>
-            <a:ext cx="11810997" cy="13143209"/>
+            <a:off x="629976" y="5432760"/>
+            <a:ext cx="11810997" cy="12443698"/>
           </a:xfrm>
           <a:prstGeom prst="roundRect">
             <a:avLst>
-              <a:gd name="adj" fmla="val 1331"/>
+              <a:gd name="adj" fmla="val 1118"/>
             </a:avLst>
           </a:prstGeom>
           <a:noFill/>
@@ -4747,12 +4747,12 @@
         </p:nvSpPr>
         <p:spPr>
           <a:xfrm>
-            <a:off x="629976" y="19094980"/>
+            <a:off x="629975" y="18034699"/>
             <a:ext cx="11810997" cy="2301453"/>
           </a:xfrm>
           <a:prstGeom prst="roundRect">
             <a:avLst>
-              <a:gd name="adj" fmla="val 10711"/>
+              <a:gd name="adj" fmla="val 5483"/>
             </a:avLst>
           </a:prstGeom>
           <a:noFill/>
@@ -4798,8 +4798,8 @@
         </p:nvSpPr>
         <p:spPr>
           <a:xfrm>
-            <a:off x="726228" y="3531951"/>
-            <a:ext cx="11714745" cy="461665"/>
+            <a:off x="726228" y="3483825"/>
+            <a:ext cx="11714745" cy="492443"/>
           </a:xfrm>
           <a:prstGeom prst="rect">
             <a:avLst/>
@@ -4816,13 +4816,13 @@
           <a:lstStyle/>
           <a:p>
             <a:r>
-              <a:rPr lang="en-US" sz="2400" dirty="0" smtClean="0">
+              <a:rPr lang="en-US" sz="2600" dirty="0" smtClean="0">
                 <a:latin typeface="Arial" pitchFamily="34" charset="0"/>
                 <a:cs typeface="Arial" pitchFamily="34" charset="0"/>
               </a:rPr>
               <a:t>Data</a:t>
             </a:r>
-            <a:endParaRPr lang="en-US" sz="2400" dirty="0">
+            <a:endParaRPr lang="en-US" sz="2600" dirty="0">
               <a:latin typeface="Arial" pitchFamily="34" charset="0"/>
               <a:cs typeface="Arial" pitchFamily="34" charset="0"/>
             </a:endParaRPr>
@@ -4837,8 +4837,8 @@
         </p:nvSpPr>
         <p:spPr>
           <a:xfrm>
-            <a:off x="726228" y="5839919"/>
-            <a:ext cx="11714745" cy="461665"/>
+            <a:off x="726228" y="5531353"/>
+            <a:ext cx="11714745" cy="492443"/>
           </a:xfrm>
           <a:prstGeom prst="rect">
             <a:avLst/>
@@ -4855,13 +4855,13 @@
           <a:lstStyle/>
           <a:p>
             <a:r>
-              <a:rPr lang="en-US" sz="2400" dirty="0" smtClean="0">
+              <a:rPr lang="en-US" sz="2600" dirty="0" smtClean="0">
                 <a:latin typeface="Arial" pitchFamily="34" charset="0"/>
                 <a:cs typeface="Arial" pitchFamily="34" charset="0"/>
               </a:rPr>
               <a:t>Metrics</a:t>
             </a:r>
-            <a:endParaRPr lang="en-US" sz="2400" dirty="0">
+            <a:endParaRPr lang="en-US" sz="2600" dirty="0">
               <a:latin typeface="Arial" pitchFamily="34" charset="0"/>
               <a:cs typeface="Arial" pitchFamily="34" charset="0"/>
             </a:endParaRPr>
@@ -4876,8 +4876,8 @@
         </p:nvSpPr>
         <p:spPr>
           <a:xfrm>
-            <a:off x="726228" y="19215533"/>
-            <a:ext cx="11714745" cy="461665"/>
+            <a:off x="726227" y="18107126"/>
+            <a:ext cx="11714745" cy="492443"/>
           </a:xfrm>
           <a:prstGeom prst="rect">
             <a:avLst/>
@@ -4894,13 +4894,13 @@
           <a:lstStyle/>
           <a:p>
             <a:r>
-              <a:rPr lang="en-US" sz="2400" dirty="0" smtClean="0">
+              <a:rPr lang="en-US" sz="2600" dirty="0" smtClean="0">
                 <a:latin typeface="Arial" pitchFamily="34" charset="0"/>
                 <a:cs typeface="Arial" pitchFamily="34" charset="0"/>
               </a:rPr>
               <a:t>Philosophy</a:t>
             </a:r>
-            <a:endParaRPr lang="en-US" sz="2400" dirty="0">
+            <a:endParaRPr lang="en-US" sz="2600" dirty="0">
               <a:latin typeface="Arial" pitchFamily="34" charset="0"/>
               <a:cs typeface="Arial" pitchFamily="34" charset="0"/>
             </a:endParaRPr>
@@ -5295,7 +5295,7 @@
         <p:spPr>
           <a:xfrm>
             <a:off x="13229426" y="3223943"/>
-            <a:ext cx="3968005" cy="461665"/>
+            <a:ext cx="3968005" cy="492443"/>
           </a:xfrm>
           <a:prstGeom prst="rect">
             <a:avLst/>
@@ -5312,13 +5312,13 @@
           <a:lstStyle/>
           <a:p>
             <a:r>
-              <a:rPr lang="en-US" sz="2400" dirty="0" smtClean="0">
+              <a:rPr lang="en-US" sz="2600" dirty="0" smtClean="0">
                 <a:latin typeface="Arial" pitchFamily="34" charset="0"/>
                 <a:cs typeface="Arial" pitchFamily="34" charset="0"/>
               </a:rPr>
               <a:t>West Region</a:t>
             </a:r>
-            <a:endParaRPr lang="en-US" sz="2400" dirty="0">
+            <a:endParaRPr lang="en-US" sz="2600" dirty="0">
               <a:latin typeface="Arial" pitchFamily="34" charset="0"/>
               <a:cs typeface="Arial" pitchFamily="34" charset="0"/>
             </a:endParaRPr>
@@ -5383,7 +5383,7 @@
         <p:spPr>
           <a:xfrm>
             <a:off x="13229427" y="18032963"/>
-            <a:ext cx="18319688" cy="461665"/>
+            <a:ext cx="18319688" cy="492443"/>
           </a:xfrm>
           <a:prstGeom prst="rect">
             <a:avLst/>
@@ -5400,13 +5400,13 @@
           <a:lstStyle/>
           <a:p>
             <a:r>
-              <a:rPr lang="en-US" sz="2400" dirty="0" smtClean="0">
+              <a:rPr lang="en-US" sz="2600" dirty="0" smtClean="0">
                 <a:latin typeface="Arial" pitchFamily="34" charset="0"/>
                 <a:cs typeface="Arial" pitchFamily="34" charset="0"/>
               </a:rPr>
               <a:t>Deep South Region</a:t>
             </a:r>
-            <a:endParaRPr lang="en-US" sz="2400" dirty="0">
+            <a:endParaRPr lang="en-US" sz="2600" dirty="0">
               <a:latin typeface="Arial" pitchFamily="34" charset="0"/>
               <a:cs typeface="Arial" pitchFamily="34" charset="0"/>
             </a:endParaRPr>
@@ -5471,7 +5471,7 @@
         <p:spPr>
           <a:xfrm>
             <a:off x="35887559" y="13040238"/>
-            <a:ext cx="8225300" cy="461665"/>
+            <a:ext cx="8225300" cy="492443"/>
           </a:xfrm>
           <a:prstGeom prst="rect">
             <a:avLst/>
@@ -5488,13 +5488,13 @@
           <a:lstStyle/>
           <a:p>
             <a:r>
-              <a:rPr lang="en-US" sz="2400" dirty="0" smtClean="0">
+              <a:rPr lang="en-US" sz="2600" dirty="0" smtClean="0">
                 <a:latin typeface="Arial" pitchFamily="34" charset="0"/>
                 <a:cs typeface="Arial" pitchFamily="34" charset="0"/>
               </a:rPr>
               <a:t>Southeast Region</a:t>
             </a:r>
-            <a:endParaRPr lang="en-US" sz="2400" dirty="0">
+            <a:endParaRPr lang="en-US" sz="2600" dirty="0">
               <a:latin typeface="Arial" pitchFamily="34" charset="0"/>
               <a:cs typeface="Arial" pitchFamily="34" charset="0"/>
             </a:endParaRPr>
@@ -5559,7 +5559,7 @@
         <p:spPr>
           <a:xfrm>
             <a:off x="37346005" y="3221255"/>
-            <a:ext cx="6637390" cy="461665"/>
+            <a:ext cx="6637390" cy="492443"/>
           </a:xfrm>
           <a:prstGeom prst="rect">
             <a:avLst/>
@@ -5576,13 +5576,13 @@
           <a:lstStyle/>
           <a:p>
             <a:r>
-              <a:rPr lang="en-US" sz="2400" dirty="0" smtClean="0">
+              <a:rPr lang="en-US" sz="2600" dirty="0" smtClean="0">
                 <a:latin typeface="Arial" pitchFamily="34" charset="0"/>
                 <a:cs typeface="Arial" pitchFamily="34" charset="0"/>
               </a:rPr>
               <a:t>Rust Belt Region</a:t>
             </a:r>
-            <a:endParaRPr lang="en-US" sz="2400" dirty="0">
+            <a:endParaRPr lang="en-US" sz="2600" dirty="0">
               <a:latin typeface="Arial" pitchFamily="34" charset="0"/>
               <a:cs typeface="Arial" pitchFamily="34" charset="0"/>
             </a:endParaRPr>
@@ -5881,7 +5881,7 @@
         <p:spPr>
           <a:xfrm>
             <a:off x="18719580" y="3208785"/>
-            <a:ext cx="11714745" cy="461665"/>
+            <a:ext cx="11714745" cy="492443"/>
           </a:xfrm>
           <a:prstGeom prst="rect">
             <a:avLst/>
@@ -5898,13 +5898,13 @@
           <a:lstStyle/>
           <a:p>
             <a:r>
-              <a:rPr lang="en-US" sz="2400" dirty="0" smtClean="0">
+              <a:rPr lang="en-US" sz="2600" dirty="0" smtClean="0">
                 <a:latin typeface="Arial" pitchFamily="34" charset="0"/>
                 <a:cs typeface="Arial" pitchFamily="34" charset="0"/>
               </a:rPr>
               <a:t>Great Plains Region</a:t>
             </a:r>
-            <a:endParaRPr lang="en-US" sz="2400" dirty="0">
+            <a:endParaRPr lang="en-US" sz="2600" dirty="0">
               <a:latin typeface="Arial" pitchFamily="34" charset="0"/>
               <a:cs typeface="Arial" pitchFamily="34" charset="0"/>
             </a:endParaRPr>
@@ -5919,8 +5919,8 @@
         </p:nvSpPr>
         <p:spPr>
           <a:xfrm>
-            <a:off x="726228" y="3953874"/>
-            <a:ext cx="11791319" cy="1477328"/>
+            <a:off x="726228" y="3905748"/>
+            <a:ext cx="11791319" cy="1400383"/>
           </a:xfrm>
           <a:prstGeom prst="rect">
             <a:avLst/>
@@ -5934,35 +5934,35 @@
           <a:lstStyle/>
           <a:p>
             <a:r>
-              <a:rPr lang="en-US" sz="1800" dirty="0" smtClean="0">
+              <a:rPr lang="en-US" sz="1700" dirty="0" smtClean="0">
                 <a:latin typeface="Arial" pitchFamily="34" charset="0"/>
                 <a:cs typeface="Arial" pitchFamily="34" charset="0"/>
               </a:rPr>
               <a:t>The data come from the Knight Foundation’s  ‘</a:t>
             </a:r>
             <a:r>
-              <a:rPr lang="en-US" sz="1800" dirty="0">
+              <a:rPr lang="en-US" sz="1700" dirty="0">
                 <a:latin typeface="Arial" pitchFamily="34" charset="0"/>
                 <a:cs typeface="Arial" pitchFamily="34" charset="0"/>
               </a:rPr>
               <a:t>Soul of the Community</a:t>
             </a:r>
             <a:r>
-              <a:rPr lang="en-US" sz="1800" dirty="0" smtClean="0">
+              <a:rPr lang="en-US" sz="1700" dirty="0" smtClean="0">
                 <a:latin typeface="Arial" pitchFamily="34" charset="0"/>
                 <a:cs typeface="Arial" pitchFamily="34" charset="0"/>
               </a:rPr>
               <a:t>’ project. The </a:t>
             </a:r>
             <a:r>
-              <a:rPr lang="en-US" sz="1800" dirty="0">
+              <a:rPr lang="en-US" sz="1700" dirty="0">
                 <a:latin typeface="Arial" pitchFamily="34" charset="0"/>
                 <a:cs typeface="Arial" pitchFamily="34" charset="0"/>
               </a:rPr>
               <a:t>Knight Foundation in cooperation with Gallup collected data from 43,000 people over </a:t>
             </a:r>
             <a:r>
-              <a:rPr lang="en-US" sz="1800" dirty="0" smtClean="0">
+              <a:rPr lang="en-US" sz="1700" dirty="0" smtClean="0">
                 <a:latin typeface="Arial" pitchFamily="34" charset="0"/>
                 <a:cs typeface="Arial" pitchFamily="34" charset="0"/>
               </a:rPr>
@@ -5980,14 +5980,14 @@
           <p:nvPr>
             <p:extLst>
               <p:ext uri="{D42A27DB-BD31-4B8C-83A1-F6EECF244321}">
-                <p14:modId xmlns:p14="http://schemas.microsoft.com/office/powerpoint/2010/main" val="184523659"/>
+                <p14:modId xmlns:p14="http://schemas.microsoft.com/office/powerpoint/2010/main" val="2859300118"/>
               </p:ext>
             </p:extLst>
           </p:nvPr>
         </p:nvGraphicFramePr>
         <p:xfrm>
-          <a:off x="726228" y="6280140"/>
-          <a:ext cx="11696221" cy="12527280"/>
+          <a:off x="726228" y="5971574"/>
+          <a:ext cx="11696221" cy="11887200"/>
         </p:xfrm>
         <a:graphic>
           <a:graphicData uri="http://schemas.openxmlformats.org/drawingml/2006/table">
@@ -6006,7 +6006,7 @@
                     <a:lstStyle/>
                     <a:p>
                       <a:r>
-                        <a:rPr lang="en-US" sz="1800" dirty="0" smtClean="0">
+                        <a:rPr lang="en-US" sz="1700" dirty="0" smtClean="0">
                           <a:latin typeface="Arial" pitchFamily="34" charset="0"/>
                           <a:cs typeface="Arial" pitchFamily="34" charset="0"/>
                         </a:rPr>
@@ -6026,20 +6026,20 @@
                         <a:buChar char="•"/>
                       </a:pPr>
                       <a:r>
-                        <a:rPr lang="en-US" sz="1800" dirty="0" smtClean="0">
+                        <a:rPr lang="en-US" sz="1700" dirty="0" smtClean="0">
                           <a:latin typeface="Arial" pitchFamily="34" charset="0"/>
                           <a:cs typeface="Arial" pitchFamily="34" charset="0"/>
                         </a:rPr>
                         <a:t>I am proud to say I live in [Community</a:t>
                       </a:r>
                       <a:r>
-                        <a:rPr lang="en-US" sz="1800" baseline="0" dirty="0" smtClean="0">
+                        <a:rPr lang="en-US" sz="1700" baseline="0" dirty="0" smtClean="0">
                           <a:latin typeface="Arial" pitchFamily="34" charset="0"/>
                           <a:cs typeface="Arial" pitchFamily="34" charset="0"/>
                         </a:rPr>
                         <a:t>].</a:t>
                       </a:r>
-                      <a:endParaRPr lang="en-US" sz="1800" dirty="0" smtClean="0">
+                      <a:endParaRPr lang="en-US" sz="1700" dirty="0" smtClean="0">
                         <a:latin typeface="Arial" pitchFamily="34" charset="0"/>
                         <a:cs typeface="Arial" pitchFamily="34" charset="0"/>
                       </a:endParaRPr>
@@ -6050,21 +6050,21 @@
                         <a:buChar char="•"/>
                       </a:pPr>
                       <a:r>
-                        <a:rPr lang="en-US" sz="1800" dirty="0" smtClean="0">
+                        <a:rPr lang="en-US" sz="1700" dirty="0" smtClean="0">
                           <a:latin typeface="Arial" pitchFamily="34" charset="0"/>
                           <a:cs typeface="Arial" pitchFamily="34" charset="0"/>
                         </a:rPr>
                         <a:t>[Community</a:t>
                       </a:r>
                       <a:r>
-                        <a:rPr lang="en-US" sz="1800" baseline="0" dirty="0" smtClean="0">
+                        <a:rPr lang="en-US" sz="1700" baseline="0" dirty="0" smtClean="0">
                           <a:latin typeface="Arial" pitchFamily="34" charset="0"/>
                           <a:cs typeface="Arial" pitchFamily="34" charset="0"/>
                         </a:rPr>
                         <a:t>] </a:t>
                       </a:r>
                       <a:r>
-                        <a:rPr lang="en-US" sz="1800" dirty="0" smtClean="0">
+                        <a:rPr lang="en-US" sz="1700" dirty="0" smtClean="0">
                           <a:latin typeface="Arial" pitchFamily="34" charset="0"/>
                           <a:cs typeface="Arial" pitchFamily="34" charset="0"/>
                         </a:rPr>
@@ -6077,7 +6077,7 @@
                         <a:buChar char="•"/>
                       </a:pPr>
                       <a:r>
-                        <a:rPr lang="en-US" sz="1800" dirty="0" smtClean="0">
+                        <a:rPr lang="en-US" sz="1700" dirty="0" smtClean="0">
                           <a:latin typeface="Arial" pitchFamily="34" charset="0"/>
                           <a:cs typeface="Arial" pitchFamily="34" charset="0"/>
                         </a:rPr>
@@ -6090,7 +6090,7 @@
                         <a:buChar char="•"/>
                       </a:pPr>
                       <a:r>
-                        <a:rPr lang="en-US" sz="1800" dirty="0" smtClean="0">
+                        <a:rPr lang="en-US" sz="1700" dirty="0" smtClean="0">
                           <a:latin typeface="Arial" pitchFamily="34" charset="0"/>
                           <a:cs typeface="Arial" pitchFamily="34" charset="0"/>
                         </a:rPr>
@@ -6103,13 +6103,13 @@
                         <a:buChar char="•"/>
                       </a:pPr>
                       <a:r>
-                        <a:rPr lang="en-US" sz="1800" dirty="0" smtClean="0">
+                        <a:rPr lang="en-US" sz="1700" dirty="0" smtClean="0">
                           <a:latin typeface="Arial" pitchFamily="34" charset="0"/>
                           <a:cs typeface="Arial" pitchFamily="34" charset="0"/>
                         </a:rPr>
                         <a:t>And thinking about five years from now, how do you think [Community] will be as a place to live compared to today?</a:t>
                       </a:r>
-                      <a:endParaRPr lang="en-US" sz="1800" dirty="0">
+                      <a:endParaRPr lang="en-US" sz="1700" dirty="0">
                         <a:latin typeface="Arial" pitchFamily="34" charset="0"/>
                         <a:cs typeface="Arial" pitchFamily="34" charset="0"/>
                       </a:endParaRPr>
@@ -6125,13 +6125,13 @@
                     <a:lstStyle/>
                     <a:p>
                       <a:r>
-                        <a:rPr lang="en-US" sz="1800" dirty="0" smtClean="0">
+                        <a:rPr lang="en-US" sz="1700" dirty="0" smtClean="0">
                           <a:latin typeface="Arial" pitchFamily="34" charset="0"/>
                           <a:cs typeface="Arial" pitchFamily="34" charset="0"/>
                         </a:rPr>
                         <a:t>Safety</a:t>
                       </a:r>
-                      <a:endParaRPr lang="en-US" sz="1800" dirty="0">
+                      <a:endParaRPr lang="en-US" sz="1700" dirty="0">
                         <a:latin typeface="Arial" pitchFamily="34" charset="0"/>
                         <a:cs typeface="Arial" pitchFamily="34" charset="0"/>
                       </a:endParaRPr>
@@ -6149,7 +6149,7 @@
                         <a:buChar char="•"/>
                       </a:pPr>
                       <a:r>
-                        <a:rPr lang="en-US" sz="1800" dirty="0" smtClean="0">
+                        <a:rPr lang="en-US" sz="1700" dirty="0" smtClean="0">
                           <a:latin typeface="Arial" pitchFamily="34" charset="0"/>
                           <a:cs typeface="Arial" pitchFamily="34" charset="0"/>
                         </a:rPr>
@@ -6162,13 +6162,13 @@
                         <a:buChar char="•"/>
                       </a:pPr>
                       <a:r>
-                        <a:rPr lang="en-US" sz="1800" dirty="0" smtClean="0">
+                        <a:rPr lang="en-US" sz="1700" dirty="0" smtClean="0">
                           <a:latin typeface="Arial" pitchFamily="34" charset="0"/>
                           <a:cs typeface="Arial" pitchFamily="34" charset="0"/>
                         </a:rPr>
                         <a:t>How would you rate the level of crime in your community?</a:t>
                       </a:r>
-                      <a:endParaRPr lang="en-US" sz="1800" dirty="0">
+                      <a:endParaRPr lang="en-US" sz="1700" dirty="0">
                         <a:latin typeface="Arial" pitchFamily="34" charset="0"/>
                         <a:cs typeface="Arial" pitchFamily="34" charset="0"/>
                       </a:endParaRPr>
@@ -6184,13 +6184,13 @@
                     <a:lstStyle/>
                     <a:p>
                       <a:r>
-                        <a:rPr lang="en-US" sz="1800" dirty="0" smtClean="0">
+                        <a:rPr lang="en-US" sz="1700" dirty="0" smtClean="0">
                           <a:latin typeface="Arial" pitchFamily="34" charset="0"/>
                           <a:cs typeface="Arial" pitchFamily="34" charset="0"/>
                         </a:rPr>
                         <a:t>Education</a:t>
                       </a:r>
-                      <a:endParaRPr lang="en-US" sz="1800" dirty="0">
+                      <a:endParaRPr lang="en-US" sz="1700" dirty="0">
                         <a:latin typeface="Arial" pitchFamily="34" charset="0"/>
                         <a:cs typeface="Arial" pitchFamily="34" charset="0"/>
                       </a:endParaRPr>
@@ -6208,7 +6208,7 @@
                         <a:buChar char="•"/>
                       </a:pPr>
                       <a:r>
-                        <a:rPr lang="en-US" sz="1800" dirty="0" smtClean="0">
+                        <a:rPr lang="en-US" sz="1700" dirty="0" smtClean="0">
                           <a:latin typeface="Arial" pitchFamily="34" charset="0"/>
                           <a:cs typeface="Arial" pitchFamily="34" charset="0"/>
                         </a:rPr>
@@ -6221,13 +6221,13 @@
                         <a:buChar char="•"/>
                       </a:pPr>
                       <a:r>
-                        <a:rPr lang="en-US" sz="1800" dirty="0" smtClean="0">
+                        <a:rPr lang="en-US" sz="1700" dirty="0" smtClean="0">
                           <a:latin typeface="Arial" pitchFamily="34" charset="0"/>
                           <a:cs typeface="Arial" pitchFamily="34" charset="0"/>
                         </a:rPr>
                         <a:t>The overall quality of the colleges and universities</a:t>
                       </a:r>
-                      <a:endParaRPr lang="en-US" sz="1800" dirty="0">
+                      <a:endParaRPr lang="en-US" sz="1700" dirty="0">
                         <a:latin typeface="Arial" pitchFamily="34" charset="0"/>
                         <a:cs typeface="Arial" pitchFamily="34" charset="0"/>
                       </a:endParaRPr>
@@ -6243,13 +6243,13 @@
                     <a:lstStyle/>
                     <a:p>
                       <a:r>
-                        <a:rPr lang="en-US" sz="1800" dirty="0" smtClean="0">
+                        <a:rPr lang="en-US" sz="1700" dirty="0" smtClean="0">
                           <a:latin typeface="Arial" pitchFamily="34" charset="0"/>
                           <a:cs typeface="Arial" pitchFamily="34" charset="0"/>
                         </a:rPr>
                         <a:t>Leadership</a:t>
                       </a:r>
-                      <a:endParaRPr lang="en-US" sz="1800" dirty="0">
+                      <a:endParaRPr lang="en-US" sz="1700" dirty="0">
                         <a:latin typeface="Arial" pitchFamily="34" charset="0"/>
                         <a:cs typeface="Arial" pitchFamily="34" charset="0"/>
                       </a:endParaRPr>
@@ -6267,7 +6267,7 @@
                         <a:buChar char="•"/>
                       </a:pPr>
                       <a:r>
-                        <a:rPr lang="en-US" sz="1800" dirty="0" smtClean="0">
+                        <a:rPr lang="en-US" sz="1700" dirty="0" smtClean="0">
                           <a:latin typeface="Arial" pitchFamily="34" charset="0"/>
                           <a:cs typeface="Arial" pitchFamily="34" charset="0"/>
                         </a:rPr>
@@ -6280,13 +6280,13 @@
                         <a:buChar char="•"/>
                       </a:pPr>
                       <a:r>
-                        <a:rPr lang="en-US" sz="1800" dirty="0" smtClean="0">
+                        <a:rPr lang="en-US" sz="1700" dirty="0" smtClean="0">
                           <a:latin typeface="Arial" pitchFamily="34" charset="0"/>
                           <a:cs typeface="Arial" pitchFamily="34" charset="0"/>
                         </a:rPr>
                         <a:t>The leaders in my community represent my interests</a:t>
                       </a:r>
-                      <a:endParaRPr lang="en-US" sz="1800" dirty="0">
+                      <a:endParaRPr lang="en-US" sz="1700" dirty="0">
                         <a:latin typeface="Arial" pitchFamily="34" charset="0"/>
                         <a:cs typeface="Arial" pitchFamily="34" charset="0"/>
                       </a:endParaRPr>
@@ -6302,7 +6302,7 @@
                     <a:lstStyle/>
                     <a:p>
                       <a:r>
-                        <a:rPr lang="en-US" sz="1800" dirty="0" smtClean="0">
+                        <a:rPr lang="en-US" sz="1700" dirty="0" smtClean="0">
                           <a:latin typeface="Arial" pitchFamily="34" charset="0"/>
                           <a:cs typeface="Arial" pitchFamily="34" charset="0"/>
                         </a:rPr>
@@ -6322,7 +6322,7 @@
                         <a:buChar char="•"/>
                       </a:pPr>
                       <a:r>
-                        <a:rPr lang="en-US" sz="1800" dirty="0" smtClean="0">
+                        <a:rPr lang="en-US" sz="1700" dirty="0" smtClean="0">
                           <a:latin typeface="Arial" pitchFamily="34" charset="0"/>
                           <a:cs typeface="Arial" pitchFamily="34" charset="0"/>
                         </a:rPr>
@@ -6335,13 +6335,13 @@
                         <a:buChar char="•"/>
                       </a:pPr>
                       <a:r>
-                        <a:rPr lang="en-US" sz="1800" dirty="0" smtClean="0">
+                        <a:rPr lang="en-US" sz="1700" dirty="0" smtClean="0">
                           <a:latin typeface="Arial" pitchFamily="34" charset="0"/>
                           <a:cs typeface="Arial" pitchFamily="34" charset="0"/>
                         </a:rPr>
                         <a:t>The beauty or physical setting</a:t>
                       </a:r>
-                      <a:endParaRPr lang="en-US" sz="1800" dirty="0">
+                      <a:endParaRPr lang="en-US" sz="1700" dirty="0">
                         <a:latin typeface="Arial" pitchFamily="34" charset="0"/>
                         <a:cs typeface="Arial" pitchFamily="34" charset="0"/>
                       </a:endParaRPr>
@@ -6357,13 +6357,13 @@
                     <a:lstStyle/>
                     <a:p>
                       <a:r>
-                        <a:rPr lang="en-US" sz="1800" dirty="0" smtClean="0">
+                        <a:rPr lang="en-US" sz="1700" dirty="0" smtClean="0">
                           <a:latin typeface="Arial" pitchFamily="34" charset="0"/>
                           <a:cs typeface="Arial" pitchFamily="34" charset="0"/>
                         </a:rPr>
                         <a:t>Economy</a:t>
                       </a:r>
-                      <a:endParaRPr lang="en-US" sz="1800" dirty="0">
+                      <a:endParaRPr lang="en-US" sz="1700" dirty="0">
                         <a:latin typeface="Arial" pitchFamily="34" charset="0"/>
                         <a:cs typeface="Arial" pitchFamily="34" charset="0"/>
                       </a:endParaRPr>
@@ -6381,7 +6381,7 @@
                         <a:buChar char="•"/>
                       </a:pPr>
                       <a:r>
-                        <a:rPr lang="en-US" sz="1800" dirty="0" smtClean="0">
+                        <a:rPr lang="en-US" sz="1700" dirty="0" smtClean="0">
                           <a:latin typeface="Arial" pitchFamily="34" charset="0"/>
                           <a:cs typeface="Arial" pitchFamily="34" charset="0"/>
                         </a:rPr>
@@ -6394,7 +6394,7 @@
                         <a:buChar char="•"/>
                       </a:pPr>
                       <a:r>
-                        <a:rPr lang="en-US" sz="1800" dirty="0" smtClean="0">
+                        <a:rPr lang="en-US" sz="1700" dirty="0" smtClean="0">
                           <a:latin typeface="Arial" pitchFamily="34" charset="0"/>
                           <a:cs typeface="Arial" pitchFamily="34" charset="0"/>
                         </a:rPr>
@@ -6407,7 +6407,7 @@
                         <a:buChar char="•"/>
                       </a:pPr>
                       <a:r>
-                        <a:rPr lang="en-US" sz="1800" dirty="0" smtClean="0">
+                        <a:rPr lang="en-US" sz="1700" dirty="0" smtClean="0">
                           <a:latin typeface="Arial" pitchFamily="34" charset="0"/>
                           <a:cs typeface="Arial" pitchFamily="34" charset="0"/>
                         </a:rPr>
@@ -6420,7 +6420,7 @@
                         <a:buChar char="•"/>
                       </a:pPr>
                       <a:r>
-                        <a:rPr lang="en-US" sz="1800" dirty="0" smtClean="0">
+                        <a:rPr lang="en-US" sz="1700" dirty="0" smtClean="0">
                           <a:latin typeface="Arial" pitchFamily="34" charset="0"/>
                           <a:cs typeface="Arial" pitchFamily="34" charset="0"/>
                         </a:rPr>
@@ -6433,7 +6433,7 @@
                         <a:buChar char="•"/>
                       </a:pPr>
                       <a:r>
-                        <a:rPr lang="en-US" sz="1800" dirty="0" smtClean="0">
+                        <a:rPr lang="en-US" sz="1700" dirty="0" smtClean="0">
                           <a:latin typeface="Arial" pitchFamily="34" charset="0"/>
                           <a:cs typeface="Arial" pitchFamily="34" charset="0"/>
                         </a:rPr>
@@ -6446,13 +6446,13 @@
                         <a:buChar char="•"/>
                       </a:pPr>
                       <a:r>
-                        <a:rPr lang="en-US" sz="1800" dirty="0" smtClean="0">
+                        <a:rPr lang="en-US" sz="1700" dirty="0" smtClean="0">
                           <a:latin typeface="Arial" pitchFamily="34" charset="0"/>
                           <a:cs typeface="Arial" pitchFamily="34" charset="0"/>
                         </a:rPr>
                         <a:t>How satisfied are you with your job, that is, the work you do?</a:t>
                       </a:r>
-                      <a:endParaRPr lang="en-US" sz="1800" dirty="0">
+                      <a:endParaRPr lang="en-US" sz="1700" dirty="0">
                         <a:latin typeface="Arial" pitchFamily="34" charset="0"/>
                         <a:cs typeface="Arial" pitchFamily="34" charset="0"/>
                       </a:endParaRPr>
@@ -6468,13 +6468,13 @@
                     <a:lstStyle/>
                     <a:p>
                       <a:r>
-                        <a:rPr lang="en-US" sz="1800" dirty="0" smtClean="0">
+                        <a:rPr lang="en-US" sz="1700" dirty="0" smtClean="0">
                           <a:latin typeface="Arial" pitchFamily="34" charset="0"/>
                           <a:cs typeface="Arial" pitchFamily="34" charset="0"/>
                         </a:rPr>
                         <a:t>Social Offerings</a:t>
                       </a:r>
-                      <a:endParaRPr lang="en-US" sz="1800" dirty="0">
+                      <a:endParaRPr lang="en-US" sz="1700" dirty="0">
                         <a:latin typeface="Arial" pitchFamily="34" charset="0"/>
                         <a:cs typeface="Arial" pitchFamily="34" charset="0"/>
                       </a:endParaRPr>
@@ -6492,7 +6492,7 @@
                         <a:buChar char="•"/>
                       </a:pPr>
                       <a:r>
-                        <a:rPr lang="en-US" sz="1800" dirty="0" smtClean="0">
+                        <a:rPr lang="en-US" sz="1700" dirty="0" smtClean="0">
                           <a:latin typeface="Arial" pitchFamily="34" charset="0"/>
                           <a:cs typeface="Arial" pitchFamily="34" charset="0"/>
                         </a:rPr>
@@ -6505,7 +6505,7 @@
                         <a:buChar char="•"/>
                       </a:pPr>
                       <a:r>
-                        <a:rPr lang="en-US" sz="1800" dirty="0" smtClean="0">
+                        <a:rPr lang="en-US" sz="1700" dirty="0" smtClean="0">
                           <a:latin typeface="Arial" pitchFamily="34" charset="0"/>
                           <a:cs typeface="Arial" pitchFamily="34" charset="0"/>
                         </a:rPr>
@@ -6518,13 +6518,13 @@
                         <a:buChar char="•"/>
                       </a:pPr>
                       <a:r>
-                        <a:rPr lang="en-US" sz="1800" dirty="0" smtClean="0">
+                        <a:rPr lang="en-US" sz="1700" dirty="0" smtClean="0">
                           <a:latin typeface="Arial" pitchFamily="34" charset="0"/>
                           <a:cs typeface="Arial" pitchFamily="34" charset="0"/>
                         </a:rPr>
                         <a:t>How much people in [Community] care about each other</a:t>
                       </a:r>
-                      <a:endParaRPr lang="en-US" sz="1800" dirty="0">
+                      <a:endParaRPr lang="en-US" sz="1700" dirty="0">
                         <a:latin typeface="Arial" pitchFamily="34" charset="0"/>
                         <a:cs typeface="Arial" pitchFamily="34" charset="0"/>
                       </a:endParaRPr>
@@ -6540,13 +6540,13 @@
                     <a:lstStyle/>
                     <a:p>
                       <a:r>
-                        <a:rPr lang="en-US" sz="1800" dirty="0" smtClean="0">
+                        <a:rPr lang="en-US" sz="1700" dirty="0" smtClean="0">
                           <a:latin typeface="Arial" pitchFamily="34" charset="0"/>
                           <a:cs typeface="Arial" pitchFamily="34" charset="0"/>
                         </a:rPr>
                         <a:t>Social Capital</a:t>
                       </a:r>
-                      <a:endParaRPr lang="en-US" sz="1800" dirty="0">
+                      <a:endParaRPr lang="en-US" sz="1700" dirty="0">
                         <a:latin typeface="Arial" pitchFamily="34" charset="0"/>
                         <a:cs typeface="Arial" pitchFamily="34" charset="0"/>
                       </a:endParaRPr>
@@ -6564,7 +6564,7 @@
                         <a:buChar char="•"/>
                       </a:pPr>
                       <a:r>
-                        <a:rPr lang="en-US" sz="1800" dirty="0" smtClean="0">
+                        <a:rPr lang="en-US" sz="1700" dirty="0" smtClean="0">
                           <a:latin typeface="Arial" pitchFamily="34" charset="0"/>
                           <a:cs typeface="Arial" pitchFamily="34" charset="0"/>
                         </a:rPr>
@@ -6577,7 +6577,7 @@
                         <a:buChar char="•"/>
                       </a:pPr>
                       <a:r>
-                        <a:rPr lang="en-US" sz="1800" dirty="0" smtClean="0">
+                        <a:rPr lang="en-US" sz="1700" dirty="0" smtClean="0">
                           <a:latin typeface="Arial" pitchFamily="34" charset="0"/>
                           <a:cs typeface="Arial" pitchFamily="34" charset="0"/>
                         </a:rPr>
@@ -6590,7 +6590,7 @@
                         <a:buChar char="•"/>
                       </a:pPr>
                       <a:r>
-                        <a:rPr lang="en-US" sz="1800" dirty="0" smtClean="0">
+                        <a:rPr lang="en-US" sz="1700" dirty="0" smtClean="0">
                           <a:latin typeface="Arial" pitchFamily="34" charset="0"/>
                           <a:cs typeface="Arial" pitchFamily="34" charset="0"/>
                         </a:rPr>
@@ -6603,13 +6603,13 @@
                         <a:buChar char="•"/>
                       </a:pPr>
                       <a:r>
-                        <a:rPr lang="en-US" sz="1800" dirty="0" smtClean="0">
+                        <a:rPr lang="en-US" sz="1700" dirty="0" smtClean="0">
                           <a:latin typeface="Arial" pitchFamily="34" charset="0"/>
                           <a:cs typeface="Arial" pitchFamily="34" charset="0"/>
                         </a:rPr>
                         <a:t>How often do you talk to or visit with your immediate neighbors?</a:t>
                       </a:r>
-                      <a:endParaRPr lang="en-US" sz="1800" dirty="0">
+                      <a:endParaRPr lang="en-US" sz="1700" dirty="0">
                         <a:latin typeface="Arial" pitchFamily="34" charset="0"/>
                         <a:cs typeface="Arial" pitchFamily="34" charset="0"/>
                       </a:endParaRPr>
@@ -6625,13 +6625,13 @@
                     <a:lstStyle/>
                     <a:p>
                       <a:r>
-                        <a:rPr lang="en-US" sz="1800" dirty="0" smtClean="0">
+                        <a:rPr lang="en-US" sz="1700" dirty="0" smtClean="0">
                           <a:latin typeface="Arial" pitchFamily="34" charset="0"/>
                           <a:cs typeface="Arial" pitchFamily="34" charset="0"/>
                         </a:rPr>
                         <a:t>Basic Services</a:t>
                       </a:r>
-                      <a:endParaRPr lang="en-US" sz="1800" dirty="0">
+                      <a:endParaRPr lang="en-US" sz="1700" dirty="0">
                         <a:latin typeface="Arial" pitchFamily="34" charset="0"/>
                         <a:cs typeface="Arial" pitchFamily="34" charset="0"/>
                       </a:endParaRPr>
@@ -6649,7 +6649,7 @@
                         <a:buChar char="•"/>
                       </a:pPr>
                       <a:r>
-                        <a:rPr lang="en-US" sz="1800" dirty="0" smtClean="0">
+                        <a:rPr lang="en-US" sz="1700" dirty="0" smtClean="0">
                           <a:latin typeface="Arial" pitchFamily="34" charset="0"/>
                           <a:cs typeface="Arial" pitchFamily="34" charset="0"/>
                         </a:rPr>
@@ -6662,7 +6662,7 @@
                         <a:buChar char="•"/>
                       </a:pPr>
                       <a:r>
-                        <a:rPr lang="en-US" sz="1800" dirty="0" smtClean="0">
+                        <a:rPr lang="en-US" sz="1700" dirty="0" smtClean="0">
                           <a:latin typeface="Arial" pitchFamily="34" charset="0"/>
                           <a:cs typeface="Arial" pitchFamily="34" charset="0"/>
                         </a:rPr>
@@ -6675,13 +6675,13 @@
                         <a:buChar char="•"/>
                       </a:pPr>
                       <a:r>
-                        <a:rPr lang="en-US" sz="1800" dirty="0" smtClean="0">
+                        <a:rPr lang="en-US" sz="1700" dirty="0" smtClean="0">
                           <a:latin typeface="Arial" pitchFamily="34" charset="0"/>
                           <a:cs typeface="Arial" pitchFamily="34" charset="0"/>
                         </a:rPr>
                         <a:t>The availability and accessibility of quality healthcare</a:t>
                       </a:r>
-                      <a:endParaRPr lang="en-US" sz="1800" dirty="0">
+                      <a:endParaRPr lang="en-US" sz="1700" dirty="0">
                         <a:latin typeface="Arial" pitchFamily="34" charset="0"/>
                         <a:cs typeface="Arial" pitchFamily="34" charset="0"/>
                       </a:endParaRPr>
@@ -6697,13 +6697,13 @@
                     <a:lstStyle/>
                     <a:p>
                       <a:r>
-                        <a:rPr lang="en-US" sz="1800" dirty="0" smtClean="0">
+                        <a:rPr lang="en-US" sz="1700" dirty="0" smtClean="0">
                           <a:latin typeface="Arial" pitchFamily="34" charset="0"/>
                           <a:cs typeface="Arial" pitchFamily="34" charset="0"/>
                         </a:rPr>
                         <a:t>Civic Involvement</a:t>
                       </a:r>
-                      <a:endParaRPr lang="en-US" sz="1800" dirty="0">
+                      <a:endParaRPr lang="en-US" sz="1700" dirty="0">
                         <a:latin typeface="Arial" pitchFamily="34" charset="0"/>
                         <a:cs typeface="Arial" pitchFamily="34" charset="0"/>
                       </a:endParaRPr>
@@ -6721,7 +6721,7 @@
                         <a:buChar char="•"/>
                       </a:pPr>
                       <a:r>
-                        <a:rPr lang="en-US" sz="1800" dirty="0" smtClean="0">
+                        <a:rPr lang="en-US" sz="1700" dirty="0" smtClean="0">
                           <a:latin typeface="Arial" pitchFamily="34" charset="0"/>
                           <a:cs typeface="Arial" pitchFamily="34" charset="0"/>
                         </a:rPr>
@@ -6734,7 +6734,7 @@
                         <a:buChar char="•"/>
                       </a:pPr>
                       <a:r>
-                        <a:rPr lang="en-US" sz="1800" dirty="0" smtClean="0">
+                        <a:rPr lang="en-US" sz="1700" dirty="0" smtClean="0">
                           <a:latin typeface="Arial" pitchFamily="34" charset="0"/>
                           <a:cs typeface="Arial" pitchFamily="34" charset="0"/>
                         </a:rPr>
@@ -6747,7 +6747,7 @@
                         <a:buChar char="•"/>
                       </a:pPr>
                       <a:r>
-                        <a:rPr lang="en-US" sz="1800" dirty="0" smtClean="0">
+                        <a:rPr lang="en-US" sz="1700" dirty="0" smtClean="0">
                           <a:latin typeface="Arial" pitchFamily="34" charset="0"/>
                           <a:cs typeface="Arial" pitchFamily="34" charset="0"/>
                         </a:rPr>
@@ -6760,13 +6760,13 @@
                         <a:buChar char="•"/>
                       </a:pPr>
                       <a:r>
-                        <a:rPr lang="en-US" sz="1800" dirty="0" smtClean="0">
+                        <a:rPr lang="en-US" sz="1700" dirty="0" smtClean="0">
                           <a:latin typeface="Arial" pitchFamily="34" charset="0"/>
                           <a:cs typeface="Arial" pitchFamily="34" charset="0"/>
                         </a:rPr>
                         <a:t>Worked with other residents to make change in the local community</a:t>
                       </a:r>
-                      <a:endParaRPr lang="en-US" sz="1800" dirty="0">
+                      <a:endParaRPr lang="en-US" sz="1700" dirty="0">
                         <a:latin typeface="Arial" pitchFamily="34" charset="0"/>
                         <a:cs typeface="Arial" pitchFamily="34" charset="0"/>
                       </a:endParaRPr>
@@ -6782,13 +6782,13 @@
                     <a:lstStyle/>
                     <a:p>
                       <a:r>
-                        <a:rPr lang="en-US" sz="1800" dirty="0" smtClean="0">
+                        <a:rPr lang="en-US" sz="1700" dirty="0" smtClean="0">
                           <a:latin typeface="Arial" pitchFamily="34" charset="0"/>
                           <a:cs typeface="Arial" pitchFamily="34" charset="0"/>
                         </a:rPr>
                         <a:t>Openness</a:t>
                       </a:r>
-                      <a:endParaRPr lang="en-US" sz="1800" dirty="0">
+                      <a:endParaRPr lang="en-US" sz="1700" dirty="0">
                         <a:latin typeface="Arial" pitchFamily="34" charset="0"/>
                         <a:cs typeface="Arial" pitchFamily="34" charset="0"/>
                       </a:endParaRPr>
@@ -6806,7 +6806,7 @@
                         <a:buChar char="•"/>
                       </a:pPr>
                       <a:r>
-                        <a:rPr lang="en-US" sz="1800" dirty="0" smtClean="0">
+                        <a:rPr lang="en-US" sz="1700" dirty="0" smtClean="0">
                           <a:latin typeface="Arial" pitchFamily="34" charset="0"/>
                           <a:cs typeface="Arial" pitchFamily="34" charset="0"/>
                         </a:rPr>
@@ -6819,7 +6819,7 @@
                         <a:buChar char="•"/>
                       </a:pPr>
                       <a:r>
-                        <a:rPr lang="en-US" sz="1800" dirty="0" smtClean="0">
+                        <a:rPr lang="en-US" sz="1700" dirty="0" smtClean="0">
                           <a:latin typeface="Arial" pitchFamily="34" charset="0"/>
                           <a:cs typeface="Arial" pitchFamily="34" charset="0"/>
                         </a:rPr>
@@ -6832,7 +6832,7 @@
                         <a:buChar char="•"/>
                       </a:pPr>
                       <a:r>
-                        <a:rPr lang="en-US" sz="1800" dirty="0" smtClean="0">
+                        <a:rPr lang="en-US" sz="1700" dirty="0" smtClean="0">
                           <a:latin typeface="Arial" pitchFamily="34" charset="0"/>
                           <a:cs typeface="Arial" pitchFamily="34" charset="0"/>
                         </a:rPr>
@@ -6845,7 +6845,7 @@
                         <a:buChar char="•"/>
                       </a:pPr>
                       <a:r>
-                        <a:rPr lang="en-US" sz="1800" dirty="0" smtClean="0">
+                        <a:rPr lang="en-US" sz="1700" dirty="0" smtClean="0">
                           <a:latin typeface="Arial" pitchFamily="34" charset="0"/>
                           <a:cs typeface="Arial" pitchFamily="34" charset="0"/>
                         </a:rPr>
@@ -6858,13 +6858,13 @@
                         <a:buChar char="•"/>
                       </a:pPr>
                       <a:r>
-                        <a:rPr lang="en-US" sz="1800" dirty="0" smtClean="0">
+                        <a:rPr lang="en-US" sz="1700" dirty="0" smtClean="0">
                           <a:latin typeface="Arial" pitchFamily="34" charset="0"/>
                           <a:cs typeface="Arial" pitchFamily="34" charset="0"/>
                         </a:rPr>
                         <a:t>Senior citizens</a:t>
                       </a:r>
-                      <a:endParaRPr lang="en-US" sz="1800" dirty="0">
+                      <a:endParaRPr lang="en-US" sz="1700" dirty="0">
                         <a:latin typeface="Arial" pitchFamily="34" charset="0"/>
                         <a:cs typeface="Arial" pitchFamily="34" charset="0"/>
                       </a:endParaRPr>
@@ -6885,8 +6885,8 @@
         </p:nvSpPr>
         <p:spPr>
           <a:xfrm>
-            <a:off x="726228" y="19653135"/>
-            <a:ext cx="11714745" cy="1754326"/>
+            <a:off x="726228" y="18592854"/>
+            <a:ext cx="11714745" cy="1661993"/>
           </a:xfrm>
           <a:prstGeom prst="rect">
             <a:avLst/>
@@ -6900,14 +6900,14 @@
           <a:lstStyle/>
           <a:p>
             <a:r>
-              <a:rPr lang="en-US" sz="1800" dirty="0" smtClean="0">
+              <a:rPr lang="en-US" sz="1700" dirty="0" smtClean="0">
                 <a:latin typeface="Arial" pitchFamily="34" charset="0"/>
                 <a:cs typeface="Arial" pitchFamily="34" charset="0"/>
               </a:rPr>
               <a:t>Our goal in this analysis is to facilitate the understanding of why people feel attachment to their communities. By utilizing an interactive and data driven web-based approach, we place the user in the driver seat of their own experience.  The philosophy behind our work has been from the point of view of a community planner, either from one of the communities in the study or from a community in the same region or a similar urbanicity. By exploring the factors that lead to community attachment in a similar community to their own, a user can apply the conclusions to their own situation. See </a:t>
             </a:r>
             <a:r>
-              <a:rPr lang="en-US" sz="1800" dirty="0" smtClean="0">
+              <a:rPr lang="en-US" sz="1700" dirty="0" smtClean="0">
                 <a:latin typeface="Arial" pitchFamily="34" charset="0"/>
                 <a:cs typeface="Arial" pitchFamily="34" charset="0"/>
                 <a:hlinkClick r:id="rId4"/>
@@ -6915,7 +6915,7 @@
               <a:t>http://glimmer.rstudio.com/andeek/DataExpo2013/</a:t>
             </a:r>
             <a:r>
-              <a:rPr lang="en-US" sz="1800" dirty="0" smtClean="0">
+              <a:rPr lang="en-US" sz="1700" dirty="0" smtClean="0">
                 <a:latin typeface="Arial" pitchFamily="34" charset="0"/>
                 <a:cs typeface="Arial" pitchFamily="34" charset="0"/>
               </a:rPr>
@@ -6924,6 +6924,218 @@
           </a:p>
         </p:txBody>
       </p:sp>
+      <p:sp>
+        <p:nvSpPr>
+          <p:cNvPr id="44" name="Rounded Rectangle 43"/>
+          <p:cNvSpPr/>
+          <p:nvPr/>
+        </p:nvSpPr>
+        <p:spPr>
+          <a:xfrm>
+            <a:off x="629975" y="20469411"/>
+            <a:ext cx="11810997" cy="912097"/>
+          </a:xfrm>
+          <a:prstGeom prst="roundRect">
+            <a:avLst>
+              <a:gd name="adj" fmla="val 10711"/>
+            </a:avLst>
+          </a:prstGeom>
+          <a:noFill/>
+          <a:ln>
+            <a:solidFill>
+              <a:schemeClr val="bg1">
+                <a:lumMod val="85000"/>
+              </a:schemeClr>
+            </a:solidFill>
+          </a:ln>
+          <a:effectLst/>
+        </p:spPr>
+        <p:style>
+          <a:lnRef idx="2">
+            <a:schemeClr val="accent1">
+              <a:shade val="50000"/>
+            </a:schemeClr>
+          </a:lnRef>
+          <a:fillRef idx="1">
+            <a:schemeClr val="accent1"/>
+          </a:fillRef>
+          <a:effectRef idx="0">
+            <a:schemeClr val="accent1"/>
+          </a:effectRef>
+          <a:fontRef idx="minor">
+            <a:schemeClr val="lt1"/>
+          </a:fontRef>
+        </p:style>
+        <p:txBody>
+          <a:bodyPr rtlCol="0" anchor="ctr"/>
+          <a:lstStyle/>
+          <a:p>
+            <a:pPr algn="ctr"/>
+            <a:endParaRPr lang="en-US"/>
+          </a:p>
+        </p:txBody>
+      </p:sp>
+      <p:sp>
+        <p:nvSpPr>
+          <p:cNvPr id="46" name="TextBox 45"/>
+          <p:cNvSpPr txBox="1"/>
+          <p:nvPr/>
+        </p:nvSpPr>
+        <p:spPr>
+          <a:xfrm>
+            <a:off x="726227" y="20541837"/>
+            <a:ext cx="11714745" cy="492443"/>
+          </a:xfrm>
+          <a:prstGeom prst="rect">
+            <a:avLst/>
+          </a:prstGeom>
+          <a:noFill/>
+          <a:ln>
+            <a:noFill/>
+          </a:ln>
+        </p:spPr>
+        <p:txBody>
+          <a:bodyPr wrap="square" rtlCol="0">
+            <a:spAutoFit/>
+          </a:bodyPr>
+          <a:lstStyle/>
+          <a:p>
+            <a:r>
+              <a:rPr lang="en-US" sz="2600" dirty="0" smtClean="0">
+                <a:latin typeface="Arial" pitchFamily="34" charset="0"/>
+                <a:cs typeface="Arial" pitchFamily="34" charset="0"/>
+              </a:rPr>
+              <a:t>Tools</a:t>
+            </a:r>
+            <a:endParaRPr lang="en-US" sz="2600" dirty="0">
+              <a:latin typeface="Arial" pitchFamily="34" charset="0"/>
+              <a:cs typeface="Arial" pitchFamily="34" charset="0"/>
+            </a:endParaRPr>
+          </a:p>
+        </p:txBody>
+      </p:sp>
+      <p:graphicFrame>
+        <p:nvGraphicFramePr>
+          <p:cNvPr id="2" name="Table 1"/>
+          <p:cNvGraphicFramePr>
+            <a:graphicFrameLocks noGrp="1"/>
+          </p:cNvGraphicFramePr>
+          <p:nvPr>
+            <p:extLst>
+              <p:ext uri="{D42A27DB-BD31-4B8C-83A1-F6EECF244321}">
+                <p14:modId xmlns:p14="http://schemas.microsoft.com/office/powerpoint/2010/main" val="3929309981"/>
+              </p:ext>
+            </p:extLst>
+          </p:nvPr>
+        </p:nvGraphicFramePr>
+        <p:xfrm>
+          <a:off x="726228" y="20992143"/>
+          <a:ext cx="11714744" cy="350520"/>
+        </p:xfrm>
+        <a:graphic>
+          <a:graphicData uri="http://schemas.openxmlformats.org/drawingml/2006/table">
+            <a:tbl>
+              <a:tblPr firstRow="1" bandRow="1">
+                <a:tableStyleId>{2D5ABB26-0587-4C30-8999-92F81FD0307C}</a:tableStyleId>
+              </a:tblPr>
+              <a:tblGrid>
+                <a:gridCol w="6087802"/>
+                <a:gridCol w="5626942"/>
+              </a:tblGrid>
+              <a:tr h="125193">
+                <a:tc>
+                  <a:txBody>
+                    <a:bodyPr/>
+                    <a:lstStyle/>
+                    <a:p>
+                      <a:pPr marL="0" marR="0" lvl="0" indent="0" algn="l" defTabSz="3762024" rtl="0" eaLnBrk="1" fontAlgn="auto" latinLnBrk="0" hangingPunct="1">
+                        <a:lnSpc>
+                          <a:spcPct val="100000"/>
+                        </a:lnSpc>
+                        <a:spcBef>
+                          <a:spcPts val="0"/>
+                        </a:spcBef>
+                        <a:spcAft>
+                          <a:spcPts val="0"/>
+                        </a:spcAft>
+                        <a:buClrTx/>
+                        <a:buSzTx/>
+                        <a:buFontTx/>
+                        <a:buNone/>
+                        <a:tabLst/>
+                        <a:defRPr/>
+                      </a:pPr>
+                      <a:r>
+                        <a:rPr kumimoji="0" lang="en-US" sz="1700" b="0" i="0" u="none" strike="noStrike" kern="1200" cap="none" spc="0" normalizeH="0" baseline="0" noProof="0" dirty="0" smtClean="0">
+                          <a:ln>
+                            <a:noFill/>
+                          </a:ln>
+                          <a:solidFill>
+                            <a:prstClr val="black"/>
+                          </a:solidFill>
+                          <a:effectLst/>
+                          <a:uLnTx/>
+                          <a:uFillTx/>
+                          <a:latin typeface="Arial" pitchFamily="34" charset="0"/>
+                          <a:ea typeface="+mn-ea"/>
+                          <a:cs typeface="Arial" pitchFamily="34" charset="0"/>
+                        </a:rPr>
+                        <a:t>Interactive Application: Shiny, D3, JQuery, Glimmer Server</a:t>
+                      </a:r>
+                      <a:endParaRPr lang="en-US" sz="1700" dirty="0"/>
+                    </a:p>
+                  </a:txBody>
+                  <a:tcPr/>
+                </a:tc>
+                <a:tc>
+                  <a:txBody>
+                    <a:bodyPr/>
+                    <a:lstStyle/>
+                    <a:p>
+                      <a:pPr marL="0" marR="0" lvl="0" indent="0" algn="l" defTabSz="3762024" rtl="0" eaLnBrk="1" fontAlgn="auto" latinLnBrk="0" hangingPunct="1">
+                        <a:lnSpc>
+                          <a:spcPct val="100000"/>
+                        </a:lnSpc>
+                        <a:spcBef>
+                          <a:spcPts val="0"/>
+                        </a:spcBef>
+                        <a:spcAft>
+                          <a:spcPts val="0"/>
+                        </a:spcAft>
+                        <a:buClrTx/>
+                        <a:buSzTx/>
+                        <a:buFontTx/>
+                        <a:buNone/>
+                        <a:tabLst/>
+                        <a:defRPr/>
+                      </a:pPr>
+                      <a:r>
+                        <a:rPr kumimoji="0" lang="en-US" sz="1700" b="0" i="0" u="none" strike="noStrike" kern="1200" cap="none" spc="0" normalizeH="0" baseline="0" noProof="0" dirty="0" smtClean="0">
+                          <a:ln>
+                            <a:noFill/>
+                          </a:ln>
+                          <a:solidFill>
+                            <a:prstClr val="black"/>
+                          </a:solidFill>
+                          <a:effectLst/>
+                          <a:uLnTx/>
+                          <a:uFillTx/>
+                          <a:latin typeface="Arial" pitchFamily="34" charset="0"/>
+                          <a:ea typeface="+mn-ea"/>
+                          <a:cs typeface="Arial" pitchFamily="34" charset="0"/>
+                        </a:rPr>
+                        <a:t>Data Manipulation: R, plyr, rjson</a:t>
+                      </a:r>
+                      <a:endParaRPr lang="en-US" sz="1700" dirty="0"/>
+                    </a:p>
+                  </a:txBody>
+                  <a:tcPr/>
+                </a:tc>
+              </a:tr>
+            </a:tbl>
+          </a:graphicData>
+        </a:graphic>
+      </p:graphicFrame>
     </p:spTree>
     <p:extLst>
       <p:ext uri="{BB962C8B-B14F-4D97-AF65-F5344CB8AC3E}">

</xml_diff>